<commit_message>
safety commit before hard drive replacement
</commit_message>
<xml_diff>
--- a/FINAL_PROJECT/Algorithms_Final_Project.pptx
+++ b/FINAL_PROJECT/Algorithms_Final_Project.pptx
@@ -4509,7 +4509,7 @@
               </a:spcBef>
             </a:pPr>
             <a:r>
-              <a:rPr lang="en-US" sz="2400" b="0" strike="noStrike" spc="-1">
+              <a:rPr lang="en-US" sz="2400" b="0" strike="noStrike" spc="-1" dirty="0">
                 <a:solidFill>
                   <a:srgbClr val="000000"/>
                 </a:solidFill>
@@ -4517,7 +4517,26 @@
               </a:rPr>
               <a:t>Mismatch threshold parameter selection for short read sequence alignment</a:t>
             </a:r>
-            <a:endParaRPr lang="en-US" sz="2400" b="0" strike="noStrike" spc="-1">
+          </a:p>
+          <a:p>
+            <a:pPr algn="ctr">
+              <a:lnSpc>
+                <a:spcPct val="90000"/>
+              </a:lnSpc>
+              <a:spcBef>
+                <a:spcPts val="1001"/>
+              </a:spcBef>
+            </a:pPr>
+            <a:r>
+              <a:rPr lang="en-US" sz="2400" spc="-1" dirty="0">
+                <a:solidFill>
+                  <a:srgbClr val="000000"/>
+                </a:solidFill>
+                <a:latin typeface="Calibri"/>
+              </a:rPr>
+              <a:t>Nathaniel Evans </a:t>
+            </a:r>
+            <a:endParaRPr lang="en-US" sz="2400" b="0" strike="noStrike" spc="-1" dirty="0">
               <a:latin typeface="Arial"/>
             </a:endParaRPr>
           </a:p>
@@ -4660,13 +4679,13 @@
               <a:buChar char="•"/>
             </a:pPr>
             <a:r>
-              <a:rPr lang="en-US" sz="2800" b="0" strike="noStrike" spc="-1">
+              <a:rPr lang="en-US" sz="2800" b="0" strike="noStrike" spc="-1" dirty="0">
                 <a:solidFill>
                   <a:srgbClr val="000000"/>
                 </a:solidFill>
                 <a:latin typeface="Calibri"/>
               </a:rPr>
-              <a:t>Goal: To find a T that will align the single strand RNA-seq 100-bp reads from wild strain PWK with the reference genome B6. </a:t>
+              <a:t>Goal: To find a T that will align the single-stranded RNA-seq 100-bp reads from wild strain PWK with the reference genome B6. </a:t>
             </a:r>
           </a:p>
           <a:p>
@@ -4678,7 +4697,7 @@
                 <a:spcPts val="1001"/>
               </a:spcBef>
             </a:pPr>
-            <a:endParaRPr lang="en-US" sz="2800" b="0" strike="noStrike" spc="-1">
+            <a:endParaRPr lang="en-US" sz="2800" b="0" strike="noStrike" spc="-1" dirty="0">
               <a:solidFill>
                 <a:srgbClr val="000000"/>
               </a:solidFill>
@@ -6565,15 +6584,15 @@
               </a:lnSpc>
             </a:pPr>
             <a:r>
-              <a:rPr lang="en-US" sz="1800" b="0" strike="noStrike" spc="-1">
+              <a:rPr lang="en-US" sz="1800" b="0" strike="noStrike" spc="-1" dirty="0">
                 <a:solidFill>
                   <a:srgbClr val="000000"/>
                 </a:solidFill>
                 <a:latin typeface="Calibri"/>
               </a:rPr>
-              <a:t>using STAR</a:t>
+              <a:t>(using STAR)</a:t>
             </a:r>
-            <a:endParaRPr lang="en-US" sz="1800" b="0" strike="noStrike" spc="-1">
+            <a:endParaRPr lang="en-US" sz="1800" b="0" strike="noStrike" spc="-1" dirty="0">
               <a:latin typeface="Arial"/>
             </a:endParaRPr>
           </a:p>
@@ -7492,7 +7511,7 @@
         </p:blipFill>
         <p:spPr>
           <a:xfrm>
-            <a:off x="190800" y="5428080"/>
+            <a:off x="226440" y="5382360"/>
             <a:ext cx="5257440" cy="1475640"/>
           </a:xfrm>
           <a:prstGeom prst="rect">
@@ -7599,18 +7618,8 @@
                 <a:spcPct val="100000"/>
               </a:lnSpc>
             </a:pPr>
-            <a:endParaRPr lang="en-US" sz="1600" b="0" strike="noStrike" spc="-1" dirty="0">
-              <a:latin typeface="Arial"/>
-            </a:endParaRPr>
-          </a:p>
-          <a:p>
-            <a:pPr>
-              <a:lnSpc>
-                <a:spcPct val="100000"/>
-              </a:lnSpc>
-            </a:pPr>
             <a:r>
-              <a:rPr lang="en-US" sz="1600" b="0" strike="noStrike" spc="-1" dirty="0">
+              <a:rPr lang="en-US" sz="1600" b="1" strike="noStrike" spc="-1" dirty="0">
                 <a:solidFill>
                   <a:srgbClr val="000000"/>
                 </a:solidFill>
@@ -7618,7 +7627,7 @@
               </a:rPr>
               <a:t>To use this method assumes:</a:t>
             </a:r>
-            <a:endParaRPr lang="en-US" sz="1600" b="0" strike="noStrike" spc="-1" dirty="0">
+            <a:endParaRPr lang="en-US" sz="1600" b="1" strike="noStrike" spc="-1" dirty="0">
               <a:latin typeface="Arial"/>
             </a:endParaRPr>
           </a:p>
@@ -7776,25 +7785,7 @@
                 </a:solidFill>
                 <a:latin typeface="Calibri"/>
               </a:rPr>
-              <a:t> </a:t>
-            </a:r>
-            <a:r>
-              <a:rPr lang="en-US" sz="1600" b="0" strike="noStrike" spc="-1">
-                <a:solidFill>
-                  <a:srgbClr val="000000"/>
-                </a:solidFill>
-                <a:latin typeface="Calibri"/>
-              </a:rPr>
-              <a:t>to pull genes </a:t>
-            </a:r>
-            <a:r>
-              <a:rPr lang="en-US" sz="1600" b="0" strike="noStrike" spc="-1" dirty="0">
-                <a:solidFill>
-                  <a:srgbClr val="000000"/>
-                </a:solidFill>
-                <a:latin typeface="Calibri"/>
-              </a:rPr>
-              <a:t>to create exon mask. </a:t>
+              <a:t> to pull genes to create exon mask. </a:t>
             </a:r>
           </a:p>
           <a:p>
@@ -10068,7 +10059,7 @@
             <a:pPr algn="ctr"/>
             <a:r>
               <a:rPr lang="en-US" dirty="0"/>
-              <a:t>Calculate variation from RNA-seq data itself by doing global optimal pairwise alignment on a small number of RNA-seq reads, and use this in the Algorithm described here. Unfortunately, this opens up a host of other parameters optimizations (score matrix &amp; gap penalties) </a:t>
+              <a:t>Calculate variation from RNA-seq data itself by doing global optimal pairwise alignment on a small number of RNA-seq reads, and use this in the Algorithm described here. Unfortunately, this opens up a host of other parameter optimizations (score matrix &amp; gap penalties) </a:t>
             </a:r>
           </a:p>
         </p:txBody>

</xml_diff>